<commit_message>
Changed GitHub link at end to proper repo
</commit_message>
<xml_diff>
--- a/Ghostbusters and Ghosts.pptx
+++ b/Ghostbusters and Ghosts.pptx
@@ -121,6 +121,11 @@
       </a:defRPr>
     </a:lvl9pPr>
   </p:defaultTextStyle>
+  <p:extLst>
+    <p:ext uri="{EFAFB233-063F-42B5-8137-9DF3F51BA10A}">
+      <p15:sldGuideLst xmlns:p15="http://schemas.microsoft.com/office/powerpoint/2012/main"/>
+    </p:ext>
+  </p:extLst>
 </p:presentation>
 </file>
 
@@ -626,7 +631,7 @@
           <a:p>
             <a:fld id="{B7821275-5666-4811-A276-0FAEFC897554}" type="datetimeFigureOut">
               <a:rPr lang="en-US" smtClean="0"/>
-              <a:t>12/1/2016</a:t>
+              <a:t>12/2/2016</a:t>
             </a:fld>
             <a:endParaRPr lang="en-US"/>
           </a:p>
@@ -922,7 +927,7 @@
           <a:p>
             <a:fld id="{B7821275-5666-4811-A276-0FAEFC897554}" type="datetimeFigureOut">
               <a:rPr lang="en-US" smtClean="0"/>
-              <a:t>12/1/2016</a:t>
+              <a:t>12/2/2016</a:t>
             </a:fld>
             <a:endParaRPr lang="en-US"/>
           </a:p>
@@ -1170,7 +1175,7 @@
           <a:p>
             <a:fld id="{B7821275-5666-4811-A276-0FAEFC897554}" type="datetimeFigureOut">
               <a:rPr lang="en-US" smtClean="0"/>
-              <a:t>12/1/2016</a:t>
+              <a:t>12/2/2016</a:t>
             </a:fld>
             <a:endParaRPr lang="en-US"/>
           </a:p>
@@ -1710,7 +1715,7 @@
           <a:p>
             <a:fld id="{B7821275-5666-4811-A276-0FAEFC897554}" type="datetimeFigureOut">
               <a:rPr lang="en-US" smtClean="0"/>
-              <a:t>12/1/2016</a:t>
+              <a:t>12/2/2016</a:t>
             </a:fld>
             <a:endParaRPr lang="en-US"/>
           </a:p>
@@ -1958,7 +1963,7 @@
           <a:p>
             <a:fld id="{B7821275-5666-4811-A276-0FAEFC897554}" type="datetimeFigureOut">
               <a:rPr lang="en-US" smtClean="0"/>
-              <a:t>12/1/2016</a:t>
+              <a:t>12/2/2016</a:t>
             </a:fld>
             <a:endParaRPr lang="en-US"/>
           </a:p>
@@ -2490,7 +2495,7 @@
           <a:p>
             <a:fld id="{B7821275-5666-4811-A276-0FAEFC897554}" type="datetimeFigureOut">
               <a:rPr lang="en-US" smtClean="0"/>
-              <a:t>12/1/2016</a:t>
+              <a:t>12/2/2016</a:t>
             </a:fld>
             <a:endParaRPr lang="en-US"/>
           </a:p>
@@ -2787,7 +2792,7 @@
           <a:p>
             <a:fld id="{B7821275-5666-4811-A276-0FAEFC897554}" type="datetimeFigureOut">
               <a:rPr lang="en-US" smtClean="0"/>
-              <a:t>12/1/2016</a:t>
+              <a:t>12/2/2016</a:t>
             </a:fld>
             <a:endParaRPr lang="en-US"/>
           </a:p>
@@ -2961,7 +2966,7 @@
           <a:p>
             <a:fld id="{B7821275-5666-4811-A276-0FAEFC897554}" type="datetimeFigureOut">
               <a:rPr lang="en-US" smtClean="0"/>
-              <a:t>12/1/2016</a:t>
+              <a:t>12/2/2016</a:t>
             </a:fld>
             <a:endParaRPr lang="en-US"/>
           </a:p>
@@ -3141,7 +3146,7 @@
           <a:p>
             <a:fld id="{B7821275-5666-4811-A276-0FAEFC897554}" type="datetimeFigureOut">
               <a:rPr lang="en-US" smtClean="0"/>
-              <a:t>12/1/2016</a:t>
+              <a:t>12/2/2016</a:t>
             </a:fld>
             <a:endParaRPr lang="en-US"/>
           </a:p>
@@ -3311,7 +3316,7 @@
           <a:p>
             <a:fld id="{B7821275-5666-4811-A276-0FAEFC897554}" type="datetimeFigureOut">
               <a:rPr lang="en-US" smtClean="0"/>
-              <a:t>12/1/2016</a:t>
+              <a:t>12/2/2016</a:t>
             </a:fld>
             <a:endParaRPr lang="en-US"/>
           </a:p>
@@ -3562,7 +3567,7 @@
           <a:p>
             <a:fld id="{B7821275-5666-4811-A276-0FAEFC897554}" type="datetimeFigureOut">
               <a:rPr lang="en-US" smtClean="0"/>
-              <a:t>12/1/2016</a:t>
+              <a:t>12/2/2016</a:t>
             </a:fld>
             <a:endParaRPr lang="en-US"/>
           </a:p>
@@ -3859,7 +3864,7 @@
           <a:p>
             <a:fld id="{B7821275-5666-4811-A276-0FAEFC897554}" type="datetimeFigureOut">
               <a:rPr lang="en-US" smtClean="0"/>
-              <a:t>12/1/2016</a:t>
+              <a:t>12/2/2016</a:t>
             </a:fld>
             <a:endParaRPr lang="en-US"/>
           </a:p>
@@ -4301,7 +4306,7 @@
           <a:p>
             <a:fld id="{B7821275-5666-4811-A276-0FAEFC897554}" type="datetimeFigureOut">
               <a:rPr lang="en-US" smtClean="0"/>
-              <a:t>12/1/2016</a:t>
+              <a:t>12/2/2016</a:t>
             </a:fld>
             <a:endParaRPr lang="en-US"/>
           </a:p>
@@ -4419,7 +4424,7 @@
           <a:p>
             <a:fld id="{B7821275-5666-4811-A276-0FAEFC897554}" type="datetimeFigureOut">
               <a:rPr lang="en-US" smtClean="0"/>
-              <a:t>12/1/2016</a:t>
+              <a:t>12/2/2016</a:t>
             </a:fld>
             <a:endParaRPr lang="en-US"/>
           </a:p>
@@ -4514,7 +4519,7 @@
           <a:p>
             <a:fld id="{B7821275-5666-4811-A276-0FAEFC897554}" type="datetimeFigureOut">
               <a:rPr lang="en-US" smtClean="0"/>
-              <a:t>12/1/2016</a:t>
+              <a:t>12/2/2016</a:t>
             </a:fld>
             <a:endParaRPr lang="en-US"/>
           </a:p>
@@ -4797,7 +4802,7 @@
           <a:p>
             <a:fld id="{B7821275-5666-4811-A276-0FAEFC897554}" type="datetimeFigureOut">
               <a:rPr lang="en-US" smtClean="0"/>
-              <a:t>12/1/2016</a:t>
+              <a:t>12/2/2016</a:t>
             </a:fld>
             <a:endParaRPr lang="en-US"/>
           </a:p>
@@ -5088,7 +5093,7 @@
           <a:p>
             <a:fld id="{B7821275-5666-4811-A276-0FAEFC897554}" type="datetimeFigureOut">
               <a:rPr lang="en-US" smtClean="0"/>
-              <a:t>12/1/2016</a:t>
+              <a:t>12/2/2016</a:t>
             </a:fld>
             <a:endParaRPr lang="en-US"/>
           </a:p>
@@ -5618,7 +5623,7 @@
           <a:p>
             <a:fld id="{B7821275-5666-4811-A276-0FAEFC897554}" type="datetimeFigureOut">
               <a:rPr lang="en-US" smtClean="0"/>
-              <a:t>12/1/2016</a:t>
+              <a:t>12/2/2016</a:t>
             </a:fld>
             <a:endParaRPr lang="en-US"/>
           </a:p>
@@ -7266,8 +7271,8 @@
           </a:p>
         </p:txBody>
       </p:sp>
-      <mc:AlternateContent xmlns:mc="http://schemas.openxmlformats.org/markup-compatibility/2006">
-        <mc:Choice xmlns:a14="http://schemas.microsoft.com/office/drawing/2010/main" Requires="a14">
+      <mc:AlternateContent xmlns:mc="http://schemas.openxmlformats.org/markup-compatibility/2006" xmlns:a14="http://schemas.microsoft.com/office/drawing/2010/main">
+        <mc:Choice Requires="a14">
           <p:sp>
             <p:nvSpPr>
               <p:cNvPr id="5" name="TextBox 4"/>
@@ -7290,6 +7295,7 @@
               </a:bodyPr>
               <a:lstStyle/>
               <a:p>
+                <a:pPr/>
                 <a14:m>
                   <m:oMathPara xmlns:m="http://schemas.openxmlformats.org/officeDocument/2006/math">
                     <m:oMathParaPr>
@@ -7344,7 +7350,7 @@
             </p:txBody>
           </p:sp>
         </mc:Choice>
-        <mc:Fallback>
+        <mc:Fallback xmlns="">
           <p:sp>
             <p:nvSpPr>
               <p:cNvPr id="5" name="TextBox 4"/>
@@ -7567,8 +7573,8 @@
           </a:p>
         </p:txBody>
       </p:sp>
-      <mc:AlternateContent xmlns:mc="http://schemas.openxmlformats.org/markup-compatibility/2006">
-        <mc:Choice xmlns:a14="http://schemas.microsoft.com/office/drawing/2010/main" Requires="a14">
+      <mc:AlternateContent xmlns:mc="http://schemas.openxmlformats.org/markup-compatibility/2006" xmlns:a14="http://schemas.microsoft.com/office/drawing/2010/main">
+        <mc:Choice Requires="a14">
           <p:sp>
             <p:nvSpPr>
               <p:cNvPr id="3" name="Content Placeholder 2"/>
@@ -7648,7 +7654,7 @@
             </p:txBody>
           </p:sp>
         </mc:Choice>
-        <mc:Fallback>
+        <mc:Fallback xmlns="">
           <p:sp>
             <p:nvSpPr>
               <p:cNvPr id="3" name="Content Placeholder 2"/>
@@ -10016,8 +10022,8 @@
           </a:p>
         </p:txBody>
       </p:sp>
-      <mc:AlternateContent xmlns:mc="http://schemas.openxmlformats.org/markup-compatibility/2006">
-        <mc:Choice xmlns:a14="http://schemas.microsoft.com/office/drawing/2010/main" Requires="a14">
+      <mc:AlternateContent xmlns:mc="http://schemas.openxmlformats.org/markup-compatibility/2006" xmlns:a14="http://schemas.microsoft.com/office/drawing/2010/main">
+        <mc:Choice Requires="a14">
           <p:sp>
             <p:nvSpPr>
               <p:cNvPr id="4" name="TextBox 3"/>
@@ -10040,6 +10046,7 @@
               </a:bodyPr>
               <a:lstStyle/>
               <a:p>
+                <a:pPr/>
                 <a14:m>
                   <m:oMathPara xmlns:m="http://schemas.openxmlformats.org/officeDocument/2006/math">
                     <m:oMathParaPr>
@@ -10128,7 +10135,7 @@
             </p:txBody>
           </p:sp>
         </mc:Choice>
-        <mc:Fallback>
+        <mc:Fallback xmlns="">
           <p:sp>
             <p:nvSpPr>
               <p:cNvPr id="4" name="TextBox 3"/>
@@ -10778,8 +10785,8 @@
           </a:p>
         </p:txBody>
       </p:sp>
-      <mc:AlternateContent xmlns:mc="http://schemas.openxmlformats.org/markup-compatibility/2006">
-        <mc:Choice xmlns:a14="http://schemas.microsoft.com/office/drawing/2010/main" Requires="a14">
+      <mc:AlternateContent xmlns:mc="http://schemas.openxmlformats.org/markup-compatibility/2006" xmlns:a14="http://schemas.microsoft.com/office/drawing/2010/main">
+        <mc:Choice Requires="a14">
           <p:sp>
             <p:nvSpPr>
               <p:cNvPr id="7" name="Content Placeholder 2"/>
@@ -11133,7 +11140,7 @@
             </p:txBody>
           </p:sp>
         </mc:Choice>
-        <mc:Fallback>
+        <mc:Fallback xmlns="">
           <p:sp>
             <p:nvSpPr>
               <p:cNvPr id="7" name="Content Placeholder 2"/>
@@ -11672,7 +11679,10 @@
               <a:rPr lang="en-US" dirty="0" err="1"/>
               <a:t>lampshadeq</a:t>
             </a:r>
-            <a:endParaRPr lang="en-US" dirty="0"/>
+            <a:r>
+              <a:rPr lang="en-US" dirty="0"/>
+              <a:t>/csci174</a:t>
+            </a:r>
           </a:p>
         </p:txBody>
       </p:sp>
@@ -12014,8 +12024,8 @@
           </a:p>
         </p:txBody>
       </p:sp>
-      <mc:AlternateContent xmlns:mc="http://schemas.openxmlformats.org/markup-compatibility/2006">
-        <mc:Choice xmlns:a14="http://schemas.microsoft.com/office/drawing/2010/main" Requires="a14">
+      <mc:AlternateContent xmlns:mc="http://schemas.openxmlformats.org/markup-compatibility/2006" xmlns:a14="http://schemas.microsoft.com/office/drawing/2010/main">
+        <mc:Choice Requires="a14">
           <p:sp>
             <p:nvSpPr>
               <p:cNvPr id="3" name="Content Placeholder 2"/>
@@ -12082,7 +12092,7 @@
             </p:txBody>
           </p:sp>
         </mc:Choice>
-        <mc:Fallback>
+        <mc:Fallback xmlns="">
           <p:sp>
             <p:nvSpPr>
               <p:cNvPr id="3" name="Content Placeholder 2"/>
@@ -13792,8 +13802,8 @@
           </a:p>
         </p:txBody>
       </p:sp>
-      <mc:AlternateContent xmlns:mc="http://schemas.openxmlformats.org/markup-compatibility/2006">
-        <mc:Choice xmlns:a14="http://schemas.microsoft.com/office/drawing/2010/main" Requires="a14">
+      <mc:AlternateContent xmlns:mc="http://schemas.openxmlformats.org/markup-compatibility/2006" xmlns:a14="http://schemas.microsoft.com/office/drawing/2010/main">
+        <mc:Choice Requires="a14">
           <p:sp>
             <p:nvSpPr>
               <p:cNvPr id="5" name="TextBox 4"/>
@@ -13816,6 +13826,7 @@
               </a:bodyPr>
               <a:lstStyle/>
               <a:p>
+                <a:pPr/>
                 <a14:m>
                   <m:oMathPara xmlns:m="http://schemas.openxmlformats.org/officeDocument/2006/math">
                     <m:oMathParaPr>
@@ -13895,7 +13906,7 @@
             </p:txBody>
           </p:sp>
         </mc:Choice>
-        <mc:Fallback>
+        <mc:Fallback xmlns="">
           <p:sp>
             <p:nvSpPr>
               <p:cNvPr id="5" name="TextBox 4"/>

</xml_diff>